<commit_message>
Minor updates in ConnectingFrontAndBack presentation
</commit_message>
<xml_diff>
--- a/Presentation/ConnectingFrontAndBack/ConnectingFrontAndBack.pptx
+++ b/Presentation/ConnectingFrontAndBack/ConnectingFrontAndBack.pptx
@@ -11,21 +11,19 @@
     <p:sldMasterId id="2147483727" r:id="rId10"/>
   </p:sldMasterIdLst>
   <p:notesMasterIdLst>
-    <p:notesMasterId r:id="rId20"/>
+    <p:notesMasterId r:id="rId18"/>
   </p:notesMasterIdLst>
   <p:handoutMasterIdLst>
-    <p:handoutMasterId r:id="rId21"/>
+    <p:handoutMasterId r:id="rId19"/>
   </p:handoutMasterIdLst>
   <p:sldIdLst>
     <p:sldId id="297" r:id="rId11"/>
     <p:sldId id="284" r:id="rId12"/>
-    <p:sldId id="285" r:id="rId13"/>
-    <p:sldId id="294" r:id="rId14"/>
-    <p:sldId id="286" r:id="rId15"/>
-    <p:sldId id="296" r:id="rId16"/>
-    <p:sldId id="295" r:id="rId17"/>
-    <p:sldId id="287" r:id="rId18"/>
-    <p:sldId id="293" r:id="rId19"/>
+    <p:sldId id="294" r:id="rId13"/>
+    <p:sldId id="286" r:id="rId14"/>
+    <p:sldId id="296" r:id="rId15"/>
+    <p:sldId id="295" r:id="rId16"/>
+    <p:sldId id="293" r:id="rId17"/>
   </p:sldIdLst>
   <p:sldSz cx="12192000" cy="6858000"/>
   <p:notesSz cx="6858000" cy="9144000"/>
@@ -217,7 +215,7 @@
           <a:p>
             <a:fld id="{312E7B4A-039C-48A2-9B2C-AF16AA3873D8}" type="datetimeFigureOut">
               <a:rPr lang="en-US" smtClean="0"/>
-              <a:t>07/07/2015</a:t>
+              <a:t>20/07/2015</a:t>
             </a:fld>
             <a:endParaRPr lang="en-US"/>
           </a:p>
@@ -382,7 +380,7 @@
           <a:p>
             <a:fld id="{DA005A0C-54D9-45AA-87D4-C551D08DFCE1}" type="datetimeFigureOut">
               <a:rPr lang="en-US" smtClean="0"/>
-              <a:t>07/07/2015</a:t>
+              <a:t>20/07/2015</a:t>
             </a:fld>
             <a:endParaRPr lang="en-US"/>
           </a:p>
@@ -794,7 +792,7 @@
             <a:fld id="{13F0F35F-DD44-4607-AEC1-49D7A4BC4066}" type="slidenum">
               <a:rPr lang="en-US" smtClean="0"/>
               <a:pPr/>
-              <a:t>3</a:t>
+              <a:t>4</a:t>
             </a:fld>
             <a:endParaRPr lang="en-US" dirty="0"/>
           </a:p>
@@ -822,187 +820,7 @@
     </p:spTree>
     <p:extLst>
       <p:ext uri="{BB962C8B-B14F-4D97-AF65-F5344CB8AC3E}">
-        <p14:creationId xmlns:p14="http://schemas.microsoft.com/office/powerpoint/2010/main" val="1904634820"/>
-      </p:ext>
-    </p:extLst>
-  </p:cSld>
-  <p:clrMapOvr>
-    <a:masterClrMapping/>
-  </p:clrMapOvr>
-</p:notes>
-</file>
-
-<file path=ppt/notesSlides/notesSlide3.xml><?xml version="1.0" encoding="utf-8"?>
-<p:notes xmlns:a="http://schemas.openxmlformats.org/drawingml/2006/main" xmlns:r="http://schemas.openxmlformats.org/officeDocument/2006/relationships" xmlns:p="http://schemas.openxmlformats.org/presentationml/2006/main">
-  <p:cSld>
-    <p:spTree>
-      <p:nvGrpSpPr>
-        <p:cNvPr id="1" name=""/>
-        <p:cNvGrpSpPr/>
-        <p:nvPr/>
-      </p:nvGrpSpPr>
-      <p:grpSpPr>
-        <a:xfrm>
-          <a:off x="0" y="0"/>
-          <a:ext cx="0" cy="0"/>
-          <a:chOff x="0" y="0"/>
-          <a:chExt cx="0" cy="0"/>
-        </a:xfrm>
-      </p:grpSpPr>
-      <p:sp>
-        <p:nvSpPr>
-          <p:cNvPr id="2" name="Slide Image Placeholder 1"/>
-          <p:cNvSpPr>
-            <a:spLocks noGrp="1" noRot="1" noChangeAspect="1"/>
-          </p:cNvSpPr>
-          <p:nvPr>
-            <p:ph type="sldImg"/>
-          </p:nvPr>
-        </p:nvSpPr>
-        <p:spPr>
-          <a:xfrm>
-            <a:off x="381000" y="685800"/>
-            <a:ext cx="6096000" cy="3429000"/>
-          </a:xfrm>
-        </p:spPr>
-      </p:sp>
-      <p:sp>
-        <p:nvSpPr>
-          <p:cNvPr id="4" name="Slide Number Placeholder 3"/>
-          <p:cNvSpPr>
-            <a:spLocks noGrp="1"/>
-          </p:cNvSpPr>
-          <p:nvPr>
-            <p:ph type="sldNum" sz="quarter" idx="10"/>
-          </p:nvPr>
-        </p:nvSpPr>
-        <p:spPr/>
-        <p:txBody>
-          <a:bodyPr/>
-          <a:lstStyle/>
-          <a:p>
-            <a:fld id="{13F0F35F-DD44-4607-AEC1-49D7A4BC4066}" type="slidenum">
-              <a:rPr lang="en-US" smtClean="0"/>
-              <a:pPr/>
-              <a:t>5</a:t>
-            </a:fld>
-            <a:endParaRPr lang="en-US" dirty="0"/>
-          </a:p>
-        </p:txBody>
-      </p:sp>
-      <p:sp>
-        <p:nvSpPr>
-          <p:cNvPr id="3" name="Notes Placeholder 2"/>
-          <p:cNvSpPr>
-            <a:spLocks noGrp="1"/>
-          </p:cNvSpPr>
-          <p:nvPr>
-            <p:ph type="body" idx="1"/>
-          </p:nvPr>
-        </p:nvSpPr>
-        <p:spPr/>
-        <p:txBody>
-          <a:bodyPr/>
-          <a:lstStyle/>
-          <a:p>
-            <a:endParaRPr lang="en-US" dirty="0"/>
-          </a:p>
-        </p:txBody>
-      </p:sp>
-    </p:spTree>
-    <p:extLst>
-      <p:ext uri="{BB962C8B-B14F-4D97-AF65-F5344CB8AC3E}">
         <p14:creationId xmlns:p14="http://schemas.microsoft.com/office/powerpoint/2010/main" val="2782372558"/>
-      </p:ext>
-    </p:extLst>
-  </p:cSld>
-  <p:clrMapOvr>
-    <a:masterClrMapping/>
-  </p:clrMapOvr>
-</p:notes>
-</file>
-
-<file path=ppt/notesSlides/notesSlide4.xml><?xml version="1.0" encoding="utf-8"?>
-<p:notes xmlns:a="http://schemas.openxmlformats.org/drawingml/2006/main" xmlns:r="http://schemas.openxmlformats.org/officeDocument/2006/relationships" xmlns:p="http://schemas.openxmlformats.org/presentationml/2006/main">
-  <p:cSld>
-    <p:spTree>
-      <p:nvGrpSpPr>
-        <p:cNvPr id="1" name=""/>
-        <p:cNvGrpSpPr/>
-        <p:nvPr/>
-      </p:nvGrpSpPr>
-      <p:grpSpPr>
-        <a:xfrm>
-          <a:off x="0" y="0"/>
-          <a:ext cx="0" cy="0"/>
-          <a:chOff x="0" y="0"/>
-          <a:chExt cx="0" cy="0"/>
-        </a:xfrm>
-      </p:grpSpPr>
-      <p:sp>
-        <p:nvSpPr>
-          <p:cNvPr id="2" name="Slide Image Placeholder 1"/>
-          <p:cNvSpPr>
-            <a:spLocks noGrp="1" noRot="1" noChangeAspect="1"/>
-          </p:cNvSpPr>
-          <p:nvPr>
-            <p:ph type="sldImg"/>
-          </p:nvPr>
-        </p:nvSpPr>
-        <p:spPr>
-          <a:xfrm>
-            <a:off x="381000" y="685800"/>
-            <a:ext cx="6096000" cy="3429000"/>
-          </a:xfrm>
-        </p:spPr>
-      </p:sp>
-      <p:sp>
-        <p:nvSpPr>
-          <p:cNvPr id="4" name="Slide Number Placeholder 3"/>
-          <p:cNvSpPr>
-            <a:spLocks noGrp="1"/>
-          </p:cNvSpPr>
-          <p:nvPr>
-            <p:ph type="sldNum" sz="quarter" idx="10"/>
-          </p:nvPr>
-        </p:nvSpPr>
-        <p:spPr/>
-        <p:txBody>
-          <a:bodyPr/>
-          <a:lstStyle/>
-          <a:p>
-            <a:fld id="{13F0F35F-DD44-4607-AEC1-49D7A4BC4066}" type="slidenum">
-              <a:rPr lang="en-US" smtClean="0"/>
-              <a:pPr/>
-              <a:t>8</a:t>
-            </a:fld>
-            <a:endParaRPr lang="en-US" dirty="0"/>
-          </a:p>
-        </p:txBody>
-      </p:sp>
-      <p:sp>
-        <p:nvSpPr>
-          <p:cNvPr id="3" name="Notes Placeholder 2"/>
-          <p:cNvSpPr>
-            <a:spLocks noGrp="1"/>
-          </p:cNvSpPr>
-          <p:nvPr>
-            <p:ph type="body" idx="1"/>
-          </p:nvPr>
-        </p:nvSpPr>
-        <p:spPr/>
-        <p:txBody>
-          <a:bodyPr/>
-          <a:lstStyle/>
-          <a:p>
-            <a:endParaRPr lang="en-US" dirty="0"/>
-          </a:p>
-        </p:txBody>
-      </p:sp>
-    </p:spTree>
-    <p:extLst>
-      <p:ext uri="{BB962C8B-B14F-4D97-AF65-F5344CB8AC3E}">
-        <p14:creationId xmlns:p14="http://schemas.microsoft.com/office/powerpoint/2010/main" val="930633583"/>
       </p:ext>
     </p:extLst>
   </p:cSld>
@@ -17585,82 +17403,6 @@
       </p:grpSpPr>
       <p:sp>
         <p:nvSpPr>
-          <p:cNvPr id="3" name="Title 2"/>
-          <p:cNvSpPr>
-            <a:spLocks noGrp="1"/>
-          </p:cNvSpPr>
-          <p:nvPr>
-            <p:ph type="ctrTitle"/>
-          </p:nvPr>
-        </p:nvSpPr>
-        <p:spPr/>
-        <p:txBody>
-          <a:bodyPr/>
-          <a:lstStyle/>
-          <a:p>
-            <a:r>
-              <a:rPr lang="en-US" dirty="0"/>
-              <a:t>Adding </a:t>
-            </a:r>
-            <a:r>
-              <a:rPr lang="en-US" dirty="0" smtClean="0"/>
-              <a:t>Libraries</a:t>
-            </a:r>
-            <a:endParaRPr lang="en-US" dirty="0"/>
-          </a:p>
-        </p:txBody>
-      </p:sp>
-    </p:spTree>
-    <p:extLst>
-      <p:ext uri="{BB962C8B-B14F-4D97-AF65-F5344CB8AC3E}">
-        <p14:creationId xmlns:p14="http://schemas.microsoft.com/office/powerpoint/2010/main" val="1132742126"/>
-      </p:ext>
-    </p:extLst>
-  </p:cSld>
-  <p:clrMapOvr>
-    <a:masterClrMapping/>
-  </p:clrMapOvr>
-  <mc:AlternateContent xmlns:mc="http://schemas.openxmlformats.org/markup-compatibility/2006" xmlns:p14="http://schemas.microsoft.com/office/powerpoint/2010/main">
-    <mc:Choice Requires="p14">
-      <p:transition spd="med" p14:dur="700">
-        <p:fade/>
-      </p:transition>
-    </mc:Choice>
-    <mc:Fallback xmlns="">
-      <p:transition spd="med">
-        <p:fade/>
-      </p:transition>
-    </mc:Fallback>
-  </mc:AlternateContent>
-  <p:timing>
-    <p:tnLst>
-      <p:par>
-        <p:cTn id="1" dur="indefinite" restart="never" nodeType="tmRoot"/>
-      </p:par>
-    </p:tnLst>
-  </p:timing>
-</p:sld>
-</file>
-
-<file path=ppt/slides/slide4.xml><?xml version="1.0" encoding="utf-8"?>
-<p:sld xmlns:a="http://schemas.openxmlformats.org/drawingml/2006/main" xmlns:r="http://schemas.openxmlformats.org/officeDocument/2006/relationships" xmlns:p="http://schemas.openxmlformats.org/presentationml/2006/main">
-  <p:cSld>
-    <p:spTree>
-      <p:nvGrpSpPr>
-        <p:cNvPr id="1" name=""/>
-        <p:cNvGrpSpPr/>
-        <p:nvPr/>
-      </p:nvGrpSpPr>
-      <p:grpSpPr>
-        <a:xfrm>
-          <a:off x="0" y="0"/>
-          <a:ext cx="0" cy="0"/>
-          <a:chOff x="0" y="0"/>
-          <a:chExt cx="0" cy="0"/>
-        </a:xfrm>
-      </p:grpSpPr>
-      <p:sp>
-        <p:nvSpPr>
           <p:cNvPr id="4" name="Subtitle 3"/>
           <p:cNvSpPr>
             <a:spLocks noGrp="1"/>
@@ -17711,7 +17453,7 @@
 </p:sld>
 </file>
 
-<file path=ppt/slides/slide5.xml><?xml version="1.0" encoding="utf-8"?>
+<file path=ppt/slides/slide4.xml><?xml version="1.0" encoding="utf-8"?>
 <p:sld xmlns:a="http://schemas.openxmlformats.org/drawingml/2006/main" xmlns:r="http://schemas.openxmlformats.org/officeDocument/2006/relationships" xmlns:p="http://schemas.openxmlformats.org/presentationml/2006/main">
   <p:cSld>
     <p:spTree>
@@ -17782,7 +17524,7 @@
 </p:sld>
 </file>
 
-<file path=ppt/slides/slide6.xml><?xml version="1.0" encoding="utf-8"?>
+<file path=ppt/slides/slide5.xml><?xml version="1.0" encoding="utf-8"?>
 <p:sld xmlns:a="http://schemas.openxmlformats.org/drawingml/2006/main" xmlns:r="http://schemas.openxmlformats.org/officeDocument/2006/relationships" xmlns:p="http://schemas.openxmlformats.org/presentationml/2006/main">
   <p:cSld>
     <p:spTree>
@@ -17895,7 +17637,7 @@
 </p:sld>
 </file>
 
-<file path=ppt/slides/slide7.xml><?xml version="1.0" encoding="utf-8"?>
+<file path=ppt/slides/slide6.xml><?xml version="1.0" encoding="utf-8"?>
 <p:sld xmlns:a="http://schemas.openxmlformats.org/drawingml/2006/main" xmlns:r="http://schemas.openxmlformats.org/officeDocument/2006/relationships" xmlns:p="http://schemas.openxmlformats.org/presentationml/2006/main">
   <p:cSld>
     <p:spTree>
@@ -17959,78 +17701,7 @@
 </p:sld>
 </file>
 
-<file path=ppt/slides/slide8.xml><?xml version="1.0" encoding="utf-8"?>
-<p:sld xmlns:a="http://schemas.openxmlformats.org/drawingml/2006/main" xmlns:r="http://schemas.openxmlformats.org/officeDocument/2006/relationships" xmlns:p="http://schemas.openxmlformats.org/presentationml/2006/main">
-  <p:cSld>
-    <p:spTree>
-      <p:nvGrpSpPr>
-        <p:cNvPr id="1" name=""/>
-        <p:cNvGrpSpPr/>
-        <p:nvPr/>
-      </p:nvGrpSpPr>
-      <p:grpSpPr>
-        <a:xfrm>
-          <a:off x="0" y="0"/>
-          <a:ext cx="0" cy="0"/>
-          <a:chOff x="0" y="0"/>
-          <a:chExt cx="0" cy="0"/>
-        </a:xfrm>
-      </p:grpSpPr>
-      <p:sp>
-        <p:nvSpPr>
-          <p:cNvPr id="3" name="Title 2"/>
-          <p:cNvSpPr>
-            <a:spLocks noGrp="1"/>
-          </p:cNvSpPr>
-          <p:nvPr>
-            <p:ph type="ctrTitle"/>
-          </p:nvPr>
-        </p:nvSpPr>
-        <p:spPr/>
-        <p:txBody>
-          <a:bodyPr/>
-          <a:lstStyle/>
-          <a:p>
-            <a:r>
-              <a:rPr lang="en-US" dirty="0"/>
-              <a:t>Sending Messages</a:t>
-            </a:r>
-          </a:p>
-        </p:txBody>
-      </p:sp>
-    </p:spTree>
-    <p:extLst>
-      <p:ext uri="{BB962C8B-B14F-4D97-AF65-F5344CB8AC3E}">
-        <p14:creationId xmlns:p14="http://schemas.microsoft.com/office/powerpoint/2010/main" val="2944701930"/>
-      </p:ext>
-    </p:extLst>
-  </p:cSld>
-  <p:clrMapOvr>
-    <a:masterClrMapping/>
-  </p:clrMapOvr>
-  <mc:AlternateContent xmlns:mc="http://schemas.openxmlformats.org/markup-compatibility/2006" xmlns:p14="http://schemas.microsoft.com/office/powerpoint/2010/main">
-    <mc:Choice Requires="p14">
-      <p:transition spd="med" p14:dur="700">
-        <p:fade/>
-      </p:transition>
-    </mc:Choice>
-    <mc:Fallback xmlns="">
-      <p:transition spd="med">
-        <p:fade/>
-      </p:transition>
-    </mc:Fallback>
-  </mc:AlternateContent>
-  <p:timing>
-    <p:tnLst>
-      <p:par>
-        <p:cTn id="1" dur="indefinite" restart="never" nodeType="tmRoot"/>
-      </p:par>
-    </p:tnLst>
-  </p:timing>
-</p:sld>
-</file>
-
-<file path=ppt/slides/slide9.xml><?xml version="1.0" encoding="utf-8"?>
+<file path=ppt/slides/slide7.xml><?xml version="1.0" encoding="utf-8"?>
 <p:sld xmlns:a="http://schemas.openxmlformats.org/drawingml/2006/main" xmlns:r="http://schemas.openxmlformats.org/officeDocument/2006/relationships" xmlns:p="http://schemas.openxmlformats.org/presentationml/2006/main">
   <p:cSld>
     <p:spTree>
@@ -20242,18 +19913,18 @@
 </file>
 
 <file path=customXml/item2.xml><?xml version="1.0" encoding="utf-8"?>
+<p:properties xmlns:p="http://schemas.microsoft.com/office/2006/metadata/properties" xmlns:xsi="http://www.w3.org/2001/XMLSchema-instance" xmlns:pc="http://schemas.microsoft.com/office/infopath/2007/PartnerControls">
+  <documentManagement/>
+</p:properties>
+</file>
+
+<file path=customXml/item3.xml><?xml version="1.0" encoding="utf-8"?>
 <?mso-contentType ?>
 <FormTemplates xmlns="http://schemas.microsoft.com/sharepoint/v3/contenttype/forms">
   <Display>DocumentLibraryForm</Display>
   <Edit>DocumentLibraryForm</Edit>
   <New>DocumentLibraryForm</New>
 </FormTemplates>
-</file>
-
-<file path=customXml/item3.xml><?xml version="1.0" encoding="utf-8"?>
-<p:properties xmlns:p="http://schemas.microsoft.com/office/2006/metadata/properties" xmlns:xsi="http://www.w3.org/2001/XMLSchema-instance" xmlns:pc="http://schemas.microsoft.com/office/infopath/2007/PartnerControls">
-  <documentManagement/>
-</p:properties>
 </file>
 
 <file path=customXml/itemProps1.xml><?xml version="1.0" encoding="utf-8"?>
@@ -20275,14 +19946,6 @@
 </file>
 
 <file path=customXml/itemProps2.xml><?xml version="1.0" encoding="utf-8"?>
-<ds:datastoreItem xmlns:ds="http://schemas.openxmlformats.org/officeDocument/2006/customXml" ds:itemID="{B0CA13EC-1D3C-4D6F-8D1C-E8A452CFC79A}">
-  <ds:schemaRefs>
-    <ds:schemaRef ds:uri="http://schemas.microsoft.com/sharepoint/v3/contenttype/forms"/>
-  </ds:schemaRefs>
-</ds:datastoreItem>
-</file>
-
-<file path=customXml/itemProps3.xml><?xml version="1.0" encoding="utf-8"?>
 <ds:datastoreItem xmlns:ds="http://schemas.openxmlformats.org/officeDocument/2006/customXml" ds:itemID="{7025FDD9-4C58-4084-9F89-0E6ADD6FFF55}">
   <ds:schemaRefs>
     <ds:schemaRef ds:uri="http://purl.org/dc/terms/"/>
@@ -20296,4 +19959,12 @@
     <ds:schemaRef ds:uri="http://purl.org/dc/dcmitype/"/>
   </ds:schemaRefs>
 </ds:datastoreItem>
+</file>
+
+<file path=customXml/itemProps3.xml><?xml version="1.0" encoding="utf-8"?>
+<ds:datastoreItem xmlns:ds="http://schemas.openxmlformats.org/officeDocument/2006/customXml" ds:itemID="{B0CA13EC-1D3C-4D6F-8D1C-E8A452CFC79A}">
+  <ds:schemaRefs>
+    <ds:schemaRef ds:uri="http://schemas.microsoft.com/sharepoint/v3/contenttype/forms"/>
+  </ds:schemaRefs>
+</ds:datastoreItem>
 </file>
</xml_diff>

<commit_message>
Created ConnectingFrontAndBack reveal.js presentation
</commit_message>
<xml_diff>
--- a/Presentation/ConnectingFrontAndBack/ConnectingFrontAndBack.pptx
+++ b/Presentation/ConnectingFrontAndBack/ConnectingFrontAndBack.pptx
@@ -220,7 +220,7 @@
           <a:p>
             <a:fld id="{312E7B4A-039C-48A2-9B2C-AF16AA3873D8}" type="datetimeFigureOut">
               <a:rPr lang="en-US" smtClean="0"/>
-              <a:t>23/07/2015</a:t>
+              <a:t>1/26/2016</a:t>
             </a:fld>
             <a:endParaRPr lang="en-US"/>
           </a:p>
@@ -385,7 +385,7 @@
           <a:p>
             <a:fld id="{DA005A0C-54D9-45AA-87D4-C551D08DFCE1}" type="datetimeFigureOut">
               <a:rPr lang="en-US" smtClean="0"/>
-              <a:t>23/07/2015</a:t>
+              <a:t>1/26/2016</a:t>
             </a:fld>
             <a:endParaRPr lang="en-US"/>
           </a:p>
@@ -1468,10 +1468,34 @@
                 <a:tableStyleId>{5C22544A-7EE6-4342-B048-85BDC9FD1C3A}</a:tableStyleId>
               </a:tblPr>
               <a:tblGrid>
-                <a:gridCol w="2764105"/>
-                <a:gridCol w="2764105"/>
-                <a:gridCol w="2764105"/>
-                <a:gridCol w="2764105"/>
+                <a:gridCol w="2764105">
+                  <a:extLst>
+                    <a:ext uri="{9D8B030D-6E8A-4147-A177-3AD203B41FA5}">
+                      <a16:colId xmlns:a16="http://schemas.microsoft.com/office/drawing/2014/main" val="20000"/>
+                    </a:ext>
+                  </a:extLst>
+                </a:gridCol>
+                <a:gridCol w="2764105">
+                  <a:extLst>
+                    <a:ext uri="{9D8B030D-6E8A-4147-A177-3AD203B41FA5}">
+                      <a16:colId xmlns:a16="http://schemas.microsoft.com/office/drawing/2014/main" val="20001"/>
+                    </a:ext>
+                  </a:extLst>
+                </a:gridCol>
+                <a:gridCol w="2764105">
+                  <a:extLst>
+                    <a:ext uri="{9D8B030D-6E8A-4147-A177-3AD203B41FA5}">
+                      <a16:colId xmlns:a16="http://schemas.microsoft.com/office/drawing/2014/main" val="20002"/>
+                    </a:ext>
+                  </a:extLst>
+                </a:gridCol>
+                <a:gridCol w="2764105">
+                  <a:extLst>
+                    <a:ext uri="{9D8B030D-6E8A-4147-A177-3AD203B41FA5}">
+                      <a16:colId xmlns:a16="http://schemas.microsoft.com/office/drawing/2014/main" val="20003"/>
+                    </a:ext>
+                  </a:extLst>
+                </a:gridCol>
               </a:tblGrid>
               <a:tr h="644435">
                 <a:tc>
@@ -1646,6 +1670,11 @@
                     </a:lnBlToTr>
                   </a:tcPr>
                 </a:tc>
+                <a:extLst>
+                  <a:ext uri="{0D108BD9-81ED-4DB2-BD59-A6C34878D82A}">
+                    <a16:rowId xmlns:a16="http://schemas.microsoft.com/office/drawing/2014/main" val="10000"/>
+                  </a:ext>
+                </a:extLst>
               </a:tr>
               <a:tr h="1225319">
                 <a:tc>
@@ -1877,6 +1906,11 @@
                     </a:lnBlToTr>
                   </a:tcPr>
                 </a:tc>
+                <a:extLst>
+                  <a:ext uri="{0D108BD9-81ED-4DB2-BD59-A6C34878D82A}">
+                    <a16:rowId xmlns:a16="http://schemas.microsoft.com/office/drawing/2014/main" val="10001"/>
+                  </a:ext>
+                </a:extLst>
               </a:tr>
               <a:tr h="1225319">
                 <a:tc>
@@ -2127,6 +2161,11 @@
                     </a:lnBlToTr>
                   </a:tcPr>
                 </a:tc>
+                <a:extLst>
+                  <a:ext uri="{0D108BD9-81ED-4DB2-BD59-A6C34878D82A}">
+                    <a16:rowId xmlns:a16="http://schemas.microsoft.com/office/drawing/2014/main" val="10002"/>
+                  </a:ext>
+                </a:extLst>
               </a:tr>
               <a:tr h="1225319">
                 <a:tc>
@@ -2377,6 +2416,11 @@
                     </a:lnBlToTr>
                   </a:tcPr>
                 </a:tc>
+                <a:extLst>
+                  <a:ext uri="{0D108BD9-81ED-4DB2-BD59-A6C34878D82A}">
+                    <a16:rowId xmlns:a16="http://schemas.microsoft.com/office/drawing/2014/main" val="10003"/>
+                  </a:ext>
+                </a:extLst>
               </a:tr>
             </a:tbl>
           </a:graphicData>
@@ -4840,10 +4884,34 @@
                 <a:tableStyleId>{93296810-A885-4BE3-A3E7-6D5BEEA58F35}</a:tableStyleId>
               </a:tblPr>
               <a:tblGrid>
-                <a:gridCol w="2764105"/>
-                <a:gridCol w="2764105"/>
-                <a:gridCol w="2764105"/>
-                <a:gridCol w="2764105"/>
+                <a:gridCol w="2764105">
+                  <a:extLst>
+                    <a:ext uri="{9D8B030D-6E8A-4147-A177-3AD203B41FA5}">
+                      <a16:colId xmlns:a16="http://schemas.microsoft.com/office/drawing/2014/main" val="20000"/>
+                    </a:ext>
+                  </a:extLst>
+                </a:gridCol>
+                <a:gridCol w="2764105">
+                  <a:extLst>
+                    <a:ext uri="{9D8B030D-6E8A-4147-A177-3AD203B41FA5}">
+                      <a16:colId xmlns:a16="http://schemas.microsoft.com/office/drawing/2014/main" val="20001"/>
+                    </a:ext>
+                  </a:extLst>
+                </a:gridCol>
+                <a:gridCol w="2764105">
+                  <a:extLst>
+                    <a:ext uri="{9D8B030D-6E8A-4147-A177-3AD203B41FA5}">
+                      <a16:colId xmlns:a16="http://schemas.microsoft.com/office/drawing/2014/main" val="20002"/>
+                    </a:ext>
+                  </a:extLst>
+                </a:gridCol>
+                <a:gridCol w="2764105">
+                  <a:extLst>
+                    <a:ext uri="{9D8B030D-6E8A-4147-A177-3AD203B41FA5}">
+                      <a16:colId xmlns:a16="http://schemas.microsoft.com/office/drawing/2014/main" val="20003"/>
+                    </a:ext>
+                  </a:extLst>
+                </a:gridCol>
               </a:tblGrid>
               <a:tr h="644435">
                 <a:tc>
@@ -5002,6 +5070,11 @@
                     </a:lnBlToTr>
                   </a:tcPr>
                 </a:tc>
+                <a:extLst>
+                  <a:ext uri="{0D108BD9-81ED-4DB2-BD59-A6C34878D82A}">
+                    <a16:rowId xmlns:a16="http://schemas.microsoft.com/office/drawing/2014/main" val="10000"/>
+                  </a:ext>
+                </a:extLst>
               </a:tr>
               <a:tr h="1225319">
                 <a:tc>
@@ -5217,6 +5290,11 @@
                     </a:lnBlToTr>
                   </a:tcPr>
                 </a:tc>
+                <a:extLst>
+                  <a:ext uri="{0D108BD9-81ED-4DB2-BD59-A6C34878D82A}">
+                    <a16:rowId xmlns:a16="http://schemas.microsoft.com/office/drawing/2014/main" val="10001"/>
+                  </a:ext>
+                </a:extLst>
               </a:tr>
               <a:tr h="1225319">
                 <a:tc>
@@ -5451,6 +5529,11 @@
                     </a:lnBlToTr>
                   </a:tcPr>
                 </a:tc>
+                <a:extLst>
+                  <a:ext uri="{0D108BD9-81ED-4DB2-BD59-A6C34878D82A}">
+                    <a16:rowId xmlns:a16="http://schemas.microsoft.com/office/drawing/2014/main" val="10002"/>
+                  </a:ext>
+                </a:extLst>
               </a:tr>
               <a:tr h="1225319">
                 <a:tc>
@@ -5685,6 +5768,11 @@
                     </a:lnBlToTr>
                   </a:tcPr>
                 </a:tc>
+                <a:extLst>
+                  <a:ext uri="{0D108BD9-81ED-4DB2-BD59-A6C34878D82A}">
+                    <a16:rowId xmlns:a16="http://schemas.microsoft.com/office/drawing/2014/main" val="10003"/>
+                  </a:ext>
+                </a:extLst>
               </a:tr>
             </a:tbl>
           </a:graphicData>
@@ -6668,10 +6756,34 @@
                 <a:tableStyleId>{21E4AEA4-8DFA-4A89-87EB-49C32662AFE0}</a:tableStyleId>
               </a:tblPr>
               <a:tblGrid>
-                <a:gridCol w="2764105"/>
-                <a:gridCol w="2764105"/>
-                <a:gridCol w="2764105"/>
-                <a:gridCol w="2764105"/>
+                <a:gridCol w="2764105">
+                  <a:extLst>
+                    <a:ext uri="{9D8B030D-6E8A-4147-A177-3AD203B41FA5}">
+                      <a16:colId xmlns:a16="http://schemas.microsoft.com/office/drawing/2014/main" val="20000"/>
+                    </a:ext>
+                  </a:extLst>
+                </a:gridCol>
+                <a:gridCol w="2764105">
+                  <a:extLst>
+                    <a:ext uri="{9D8B030D-6E8A-4147-A177-3AD203B41FA5}">
+                      <a16:colId xmlns:a16="http://schemas.microsoft.com/office/drawing/2014/main" val="20001"/>
+                    </a:ext>
+                  </a:extLst>
+                </a:gridCol>
+                <a:gridCol w="2764105">
+                  <a:extLst>
+                    <a:ext uri="{9D8B030D-6E8A-4147-A177-3AD203B41FA5}">
+                      <a16:colId xmlns:a16="http://schemas.microsoft.com/office/drawing/2014/main" val="20002"/>
+                    </a:ext>
+                  </a:extLst>
+                </a:gridCol>
+                <a:gridCol w="2764105">
+                  <a:extLst>
+                    <a:ext uri="{9D8B030D-6E8A-4147-A177-3AD203B41FA5}">
+                      <a16:colId xmlns:a16="http://schemas.microsoft.com/office/drawing/2014/main" val="20003"/>
+                    </a:ext>
+                  </a:extLst>
+                </a:gridCol>
               </a:tblGrid>
               <a:tr h="644435">
                 <a:tc>
@@ -6842,6 +6954,11 @@
                     </a:solidFill>
                   </a:tcPr>
                 </a:tc>
+                <a:extLst>
+                  <a:ext uri="{0D108BD9-81ED-4DB2-BD59-A6C34878D82A}">
+                    <a16:rowId xmlns:a16="http://schemas.microsoft.com/office/drawing/2014/main" val="10000"/>
+                  </a:ext>
+                </a:extLst>
               </a:tr>
               <a:tr h="1225319">
                 <a:tc>
@@ -7069,6 +7186,11 @@
                     </a:solidFill>
                   </a:tcPr>
                 </a:tc>
+                <a:extLst>
+                  <a:ext uri="{0D108BD9-81ED-4DB2-BD59-A6C34878D82A}">
+                    <a16:rowId xmlns:a16="http://schemas.microsoft.com/office/drawing/2014/main" val="10001"/>
+                  </a:ext>
+                </a:extLst>
               </a:tr>
               <a:tr h="1225319">
                 <a:tc>
@@ -7323,6 +7445,11 @@
                     </a:solidFill>
                   </a:tcPr>
                 </a:tc>
+                <a:extLst>
+                  <a:ext uri="{0D108BD9-81ED-4DB2-BD59-A6C34878D82A}">
+                    <a16:rowId xmlns:a16="http://schemas.microsoft.com/office/drawing/2014/main" val="10002"/>
+                  </a:ext>
+                </a:extLst>
               </a:tr>
               <a:tr h="1225319">
                 <a:tc>
@@ -7569,6 +7696,11 @@
                     </a:solidFill>
                   </a:tcPr>
                 </a:tc>
+                <a:extLst>
+                  <a:ext uri="{0D108BD9-81ED-4DB2-BD59-A6C34878D82A}">
+                    <a16:rowId xmlns:a16="http://schemas.microsoft.com/office/drawing/2014/main" val="10003"/>
+                  </a:ext>
+                </a:extLst>
               </a:tr>
             </a:tbl>
           </a:graphicData>
@@ -8439,10 +8571,34 @@
                 <a:tableStyleId>{5C22544A-7EE6-4342-B048-85BDC9FD1C3A}</a:tableStyleId>
               </a:tblPr>
               <a:tblGrid>
-                <a:gridCol w="2764105"/>
-                <a:gridCol w="2764105"/>
-                <a:gridCol w="2764105"/>
-                <a:gridCol w="2764105"/>
+                <a:gridCol w="2764105">
+                  <a:extLst>
+                    <a:ext uri="{9D8B030D-6E8A-4147-A177-3AD203B41FA5}">
+                      <a16:colId xmlns:a16="http://schemas.microsoft.com/office/drawing/2014/main" val="20000"/>
+                    </a:ext>
+                  </a:extLst>
+                </a:gridCol>
+                <a:gridCol w="2764105">
+                  <a:extLst>
+                    <a:ext uri="{9D8B030D-6E8A-4147-A177-3AD203B41FA5}">
+                      <a16:colId xmlns:a16="http://schemas.microsoft.com/office/drawing/2014/main" val="20001"/>
+                    </a:ext>
+                  </a:extLst>
+                </a:gridCol>
+                <a:gridCol w="2764105">
+                  <a:extLst>
+                    <a:ext uri="{9D8B030D-6E8A-4147-A177-3AD203B41FA5}">
+                      <a16:colId xmlns:a16="http://schemas.microsoft.com/office/drawing/2014/main" val="20002"/>
+                    </a:ext>
+                  </a:extLst>
+                </a:gridCol>
+                <a:gridCol w="2764105">
+                  <a:extLst>
+                    <a:ext uri="{9D8B030D-6E8A-4147-A177-3AD203B41FA5}">
+                      <a16:colId xmlns:a16="http://schemas.microsoft.com/office/drawing/2014/main" val="20003"/>
+                    </a:ext>
+                  </a:extLst>
+                </a:gridCol>
               </a:tblGrid>
               <a:tr h="644435">
                 <a:tc>
@@ -8617,6 +8773,11 @@
                     </a:lnBlToTr>
                   </a:tcPr>
                 </a:tc>
+                <a:extLst>
+                  <a:ext uri="{0D108BD9-81ED-4DB2-BD59-A6C34878D82A}">
+                    <a16:rowId xmlns:a16="http://schemas.microsoft.com/office/drawing/2014/main" val="10000"/>
+                  </a:ext>
+                </a:extLst>
               </a:tr>
               <a:tr h="1225319">
                 <a:tc>
@@ -8848,6 +9009,11 @@
                     </a:lnBlToTr>
                   </a:tcPr>
                 </a:tc>
+                <a:extLst>
+                  <a:ext uri="{0D108BD9-81ED-4DB2-BD59-A6C34878D82A}">
+                    <a16:rowId xmlns:a16="http://schemas.microsoft.com/office/drawing/2014/main" val="10001"/>
+                  </a:ext>
+                </a:extLst>
               </a:tr>
               <a:tr h="1225319">
                 <a:tc>
@@ -9098,6 +9264,11 @@
                     </a:lnBlToTr>
                   </a:tcPr>
                 </a:tc>
+                <a:extLst>
+                  <a:ext uri="{0D108BD9-81ED-4DB2-BD59-A6C34878D82A}">
+                    <a16:rowId xmlns:a16="http://schemas.microsoft.com/office/drawing/2014/main" val="10002"/>
+                  </a:ext>
+                </a:extLst>
               </a:tr>
               <a:tr h="1225319">
                 <a:tc>
@@ -9348,6 +9519,11 @@
                     </a:lnBlToTr>
                   </a:tcPr>
                 </a:tc>
+                <a:extLst>
+                  <a:ext uri="{0D108BD9-81ED-4DB2-BD59-A6C34878D82A}">
+                    <a16:rowId xmlns:a16="http://schemas.microsoft.com/office/drawing/2014/main" val="10003"/>
+                  </a:ext>
+                </a:extLst>
               </a:tr>
             </a:tbl>
           </a:graphicData>
@@ -10329,10 +10505,34 @@
                 <a:tableStyleId>{5C22544A-7EE6-4342-B048-85BDC9FD1C3A}</a:tableStyleId>
               </a:tblPr>
               <a:tblGrid>
-                <a:gridCol w="2764105"/>
-                <a:gridCol w="2764105"/>
-                <a:gridCol w="2764105"/>
-                <a:gridCol w="2764105"/>
+                <a:gridCol w="2764105">
+                  <a:extLst>
+                    <a:ext uri="{9D8B030D-6E8A-4147-A177-3AD203B41FA5}">
+                      <a16:colId xmlns:a16="http://schemas.microsoft.com/office/drawing/2014/main" val="20000"/>
+                    </a:ext>
+                  </a:extLst>
+                </a:gridCol>
+                <a:gridCol w="2764105">
+                  <a:extLst>
+                    <a:ext uri="{9D8B030D-6E8A-4147-A177-3AD203B41FA5}">
+                      <a16:colId xmlns:a16="http://schemas.microsoft.com/office/drawing/2014/main" val="20001"/>
+                    </a:ext>
+                  </a:extLst>
+                </a:gridCol>
+                <a:gridCol w="2764105">
+                  <a:extLst>
+                    <a:ext uri="{9D8B030D-6E8A-4147-A177-3AD203B41FA5}">
+                      <a16:colId xmlns:a16="http://schemas.microsoft.com/office/drawing/2014/main" val="20002"/>
+                    </a:ext>
+                  </a:extLst>
+                </a:gridCol>
+                <a:gridCol w="2764105">
+                  <a:extLst>
+                    <a:ext uri="{9D8B030D-6E8A-4147-A177-3AD203B41FA5}">
+                      <a16:colId xmlns:a16="http://schemas.microsoft.com/office/drawing/2014/main" val="20003"/>
+                    </a:ext>
+                  </a:extLst>
+                </a:gridCol>
               </a:tblGrid>
               <a:tr h="644435">
                 <a:tc>
@@ -10507,6 +10707,11 @@
                     </a:lnBlToTr>
                   </a:tcPr>
                 </a:tc>
+                <a:extLst>
+                  <a:ext uri="{0D108BD9-81ED-4DB2-BD59-A6C34878D82A}">
+                    <a16:rowId xmlns:a16="http://schemas.microsoft.com/office/drawing/2014/main" val="10000"/>
+                  </a:ext>
+                </a:extLst>
               </a:tr>
               <a:tr h="1225319">
                 <a:tc>
@@ -10738,6 +10943,11 @@
                     </a:lnBlToTr>
                   </a:tcPr>
                 </a:tc>
+                <a:extLst>
+                  <a:ext uri="{0D108BD9-81ED-4DB2-BD59-A6C34878D82A}">
+                    <a16:rowId xmlns:a16="http://schemas.microsoft.com/office/drawing/2014/main" val="10001"/>
+                  </a:ext>
+                </a:extLst>
               </a:tr>
               <a:tr h="1225319">
                 <a:tc>
@@ -10988,6 +11198,11 @@
                     </a:lnBlToTr>
                   </a:tcPr>
                 </a:tc>
+                <a:extLst>
+                  <a:ext uri="{0D108BD9-81ED-4DB2-BD59-A6C34878D82A}">
+                    <a16:rowId xmlns:a16="http://schemas.microsoft.com/office/drawing/2014/main" val="10002"/>
+                  </a:ext>
+                </a:extLst>
               </a:tr>
               <a:tr h="1225319">
                 <a:tc>
@@ -11238,6 +11453,11 @@
                     </a:lnBlToTr>
                   </a:tcPr>
                 </a:tc>
+                <a:extLst>
+                  <a:ext uri="{0D108BD9-81ED-4DB2-BD59-A6C34878D82A}">
+                    <a16:rowId xmlns:a16="http://schemas.microsoft.com/office/drawing/2014/main" val="10003"/>
+                  </a:ext>
+                </a:extLst>
               </a:tr>
             </a:tbl>
           </a:graphicData>
@@ -18175,13 +18395,13 @@
   <p:clrMapOvr>
     <a:masterClrMapping/>
   </p:clrMapOvr>
-  <mc:AlternateContent xmlns:mc="http://schemas.openxmlformats.org/markup-compatibility/2006">
-    <mc:Choice xmlns:p14="http://schemas.microsoft.com/office/powerpoint/2010/main" Requires="p14">
+  <mc:AlternateContent xmlns:mc="http://schemas.openxmlformats.org/markup-compatibility/2006" xmlns:p14="http://schemas.microsoft.com/office/powerpoint/2010/main">
+    <mc:Choice Requires="p14">
       <p:transition spd="med" p14:dur="700">
         <p:fade/>
       </p:transition>
     </mc:Choice>
-    <mc:Fallback>
+    <mc:Fallback xmlns="">
       <p:transition spd="med">
         <p:fade/>
       </p:transition>
@@ -18231,7 +18451,11 @@
           <a:p>
             <a:r>
               <a:rPr lang="en-US" dirty="0" smtClean="0"/>
-              <a:t>Socket I.O Messages</a:t>
+              <a:t>Socket.IO </a:t>
+            </a:r>
+            <a:r>
+              <a:rPr lang="en-US" dirty="0" smtClean="0"/>
+              <a:t>Messages</a:t>
             </a:r>
             <a:endParaRPr lang="en-US" dirty="0"/>
           </a:p>
@@ -18295,13 +18519,13 @@
   <p:clrMapOvr>
     <a:masterClrMapping/>
   </p:clrMapOvr>
-  <mc:AlternateContent xmlns:mc="http://schemas.openxmlformats.org/markup-compatibility/2006">
-    <mc:Choice xmlns:p14="http://schemas.microsoft.com/office/powerpoint/2010/main" Requires="p14">
+  <mc:AlternateContent xmlns:mc="http://schemas.openxmlformats.org/markup-compatibility/2006" xmlns:p14="http://schemas.microsoft.com/office/powerpoint/2010/main">
+    <mc:Choice Requires="p14">
       <p:transition spd="med" p14:dur="700">
         <p:fade/>
       </p:transition>
     </mc:Choice>
-    <mc:Fallback>
+    <mc:Fallback xmlns="">
       <p:transition spd="med">
         <p:fade/>
       </p:transition>
@@ -18366,13 +18590,13 @@
   <p:clrMapOvr>
     <a:masterClrMapping/>
   </p:clrMapOvr>
-  <mc:AlternateContent xmlns:mc="http://schemas.openxmlformats.org/markup-compatibility/2006">
-    <mc:Choice xmlns:p14="http://schemas.microsoft.com/office/powerpoint/2010/main" Requires="p14">
+  <mc:AlternateContent xmlns:mc="http://schemas.openxmlformats.org/markup-compatibility/2006" xmlns:p14="http://schemas.microsoft.com/office/powerpoint/2010/main">
+    <mc:Choice Requires="p14">
       <p:transition spd="med" p14:dur="700">
         <p:fade/>
       </p:transition>
     </mc:Choice>
-    <mc:Fallback>
+    <mc:Fallback xmlns="">
       <p:transition spd="med">
         <p:fade/>
       </p:transition>
@@ -18415,13 +18639,13 @@
   <p:clrMapOvr>
     <a:masterClrMapping/>
   </p:clrMapOvr>
-  <mc:AlternateContent xmlns:mc="http://schemas.openxmlformats.org/markup-compatibility/2006">
-    <mc:Choice xmlns:p14="http://schemas.microsoft.com/office/powerpoint/2010/main" Requires="p14">
+  <mc:AlternateContent xmlns:mc="http://schemas.openxmlformats.org/markup-compatibility/2006" xmlns:p14="http://schemas.microsoft.com/office/powerpoint/2010/main">
+    <mc:Choice Requires="p14">
       <p:transition spd="med" p14:dur="700">
         <p:fade/>
       </p:transition>
     </mc:Choice>
-    <mc:Fallback>
+    <mc:Fallback xmlns="">
       <p:transition spd="med">
         <p:fade/>
       </p:transition>
@@ -18510,23 +18734,12 @@
             </a:pPr>
             <a:r>
               <a:rPr lang="en-GB" dirty="0" smtClean="0"/>
-              <a:t>Listening for Messages</a:t>
-            </a:r>
-          </a:p>
-          <a:p>
-            <a:pPr marL="742950" indent="-742950">
-              <a:buFont typeface="+mj-lt"/>
-              <a:buAutoNum type="arabicParenR"/>
-            </a:pPr>
+              <a:t>Listening </a:t>
+            </a:r>
             <a:r>
               <a:rPr lang="en-GB" dirty="0" smtClean="0"/>
-              <a:t>Sending Messages</a:t>
-            </a:r>
-          </a:p>
-          <a:p>
-            <a:pPr marL="0" indent="0">
-              <a:buNone/>
-            </a:pPr>
+              <a:t>and Sending Messages</a:t>
+            </a:r>
             <a:endParaRPr lang="en-GB" dirty="0" smtClean="0"/>
           </a:p>
         </p:txBody>
@@ -18541,13 +18754,13 @@
   <p:clrMapOvr>
     <a:masterClrMapping/>
   </p:clrMapOvr>
-  <mc:AlternateContent xmlns:mc="http://schemas.openxmlformats.org/markup-compatibility/2006">
-    <mc:Choice xmlns:p14="http://schemas.microsoft.com/office/powerpoint/2010/main" Requires="p14">
+  <mc:AlternateContent xmlns:mc="http://schemas.openxmlformats.org/markup-compatibility/2006" xmlns:p14="http://schemas.microsoft.com/office/powerpoint/2010/main">
+    <mc:Choice Requires="p14">
       <p:transition spd="med" p14:dur="700">
         <p:fade/>
       </p:transition>
     </mc:Choice>
-    <mc:Fallback>
+    <mc:Fallback xmlns="">
       <p:transition spd="med">
         <p:fade/>
       </p:transition>
@@ -18597,7 +18810,15 @@
           <a:p>
             <a:r>
               <a:rPr lang="en-US" dirty="0"/>
-              <a:t>Adding in libraries to the </a:t>
+              <a:t>Adding </a:t>
+            </a:r>
+            <a:r>
+              <a:rPr lang="en-US" dirty="0" smtClean="0"/>
+              <a:t>Libraries </a:t>
+            </a:r>
+            <a:r>
+              <a:rPr lang="en-US" dirty="0"/>
+              <a:t>to the </a:t>
             </a:r>
             <a:r>
               <a:rPr lang="en-US" dirty="0" err="1"/>
@@ -18617,13 +18838,13 @@
   <p:clrMapOvr>
     <a:masterClrMapping/>
   </p:clrMapOvr>
-  <mc:AlternateContent xmlns:mc="http://schemas.openxmlformats.org/markup-compatibility/2006">
-    <mc:Choice xmlns:p14="http://schemas.microsoft.com/office/powerpoint/2010/main" Requires="p14">
+  <mc:AlternateContent xmlns:mc="http://schemas.openxmlformats.org/markup-compatibility/2006" xmlns:p14="http://schemas.microsoft.com/office/powerpoint/2010/main">
+    <mc:Choice Requires="p14">
       <p:transition spd="med" p14:dur="700">
         <p:fade/>
       </p:transition>
     </mc:Choice>
-    <mc:Fallback>
+    <mc:Fallback xmlns="">
       <p:transition spd="med">
         <p:fade/>
       </p:transition>
@@ -18672,9 +18893,14 @@
           <a:lstStyle/>
           <a:p>
             <a:r>
-              <a:rPr lang="en-US" dirty="0"/>
-              <a:t>Listening for Messages</a:t>
-            </a:r>
+              <a:rPr lang="en-GB" dirty="0"/>
+              <a:t>Listening and Sending </a:t>
+            </a:r>
+            <a:r>
+              <a:rPr lang="en-GB" dirty="0" smtClean="0"/>
+              <a:t>Messages</a:t>
+            </a:r>
+            <a:endParaRPr lang="en-US" dirty="0"/>
           </a:p>
         </p:txBody>
       </p:sp>
@@ -18688,13 +18914,13 @@
   <p:clrMapOvr>
     <a:masterClrMapping/>
   </p:clrMapOvr>
-  <mc:AlternateContent xmlns:mc="http://schemas.openxmlformats.org/markup-compatibility/2006">
-    <mc:Choice xmlns:p14="http://schemas.microsoft.com/office/powerpoint/2010/main" Requires="p14">
+  <mc:AlternateContent xmlns:mc="http://schemas.openxmlformats.org/markup-compatibility/2006" xmlns:p14="http://schemas.microsoft.com/office/powerpoint/2010/main">
+    <mc:Choice Requires="p14">
       <p:transition spd="med" p14:dur="700">
         <p:fade/>
       </p:transition>
     </mc:Choice>
-    <mc:Fallback>
+    <mc:Fallback xmlns="">
       <p:transition spd="med">
         <p:fade/>
       </p:transition>
@@ -19622,13 +19848,13 @@
   <p:clrMapOvr>
     <a:masterClrMapping/>
   </p:clrMapOvr>
-  <mc:AlternateContent xmlns:mc="http://schemas.openxmlformats.org/markup-compatibility/2006">
-    <mc:Choice xmlns:p14="http://schemas.microsoft.com/office/powerpoint/2010/main" Requires="p14">
+  <mc:AlternateContent xmlns:mc="http://schemas.openxmlformats.org/markup-compatibility/2006" xmlns:p14="http://schemas.microsoft.com/office/powerpoint/2010/main">
+    <mc:Choice Requires="p14">
       <p:transition spd="med" p14:dur="700">
         <p:fade/>
       </p:transition>
     </mc:Choice>
-    <mc:Fallback>
+    <mc:Fallback xmlns="">
       <p:transition spd="med">
         <p:fade/>
       </p:transition>
@@ -20903,13 +21129,13 @@
   <p:clrMapOvr>
     <a:masterClrMapping/>
   </p:clrMapOvr>
-  <mc:AlternateContent xmlns:mc="http://schemas.openxmlformats.org/markup-compatibility/2006">
-    <mc:Choice xmlns:p14="http://schemas.microsoft.com/office/powerpoint/2010/main" Requires="p14">
+  <mc:AlternateContent xmlns:mc="http://schemas.openxmlformats.org/markup-compatibility/2006" xmlns:p14="http://schemas.microsoft.com/office/powerpoint/2010/main">
+    <mc:Choice Requires="p14">
       <p:transition spd="med" p14:dur="700">
         <p:fade/>
       </p:transition>
     </mc:Choice>
-    <mc:Fallback>
+    <mc:Fallback xmlns="">
       <p:transition spd="med">
         <p:fade/>
       </p:transition>
@@ -21530,7 +21756,7 @@
                   <a:lin ang="5400000" scaled="0"/>
                 </a:gradFill>
               </a:rPr>
-              <a:t>Socket.io!!!</a:t>
+              <a:t>Socket.IO!!!</a:t>
             </a:r>
             <a:endParaRPr lang="en-US" sz="4400" dirty="0">
               <a:gradFill>
@@ -21558,13 +21784,13 @@
   <p:clrMapOvr>
     <a:masterClrMapping/>
   </p:clrMapOvr>
-  <mc:AlternateContent xmlns:mc="http://schemas.openxmlformats.org/markup-compatibility/2006">
-    <mc:Choice xmlns:p14="http://schemas.microsoft.com/office/powerpoint/2010/main" Requires="p14">
+  <mc:AlternateContent xmlns:mc="http://schemas.openxmlformats.org/markup-compatibility/2006" xmlns:p14="http://schemas.microsoft.com/office/powerpoint/2010/main">
+    <mc:Choice Requires="p14">
       <p:transition spd="med" p14:dur="700">
         <p:fade/>
       </p:transition>
     </mc:Choice>
-    <mc:Fallback>
+    <mc:Fallback xmlns="">
       <p:transition spd="med">
         <p:fade/>
       </p:transition>
@@ -21746,7 +21972,7 @@
             </a:r>
             <a:r>
               <a:rPr lang="en-US" dirty="0" smtClean="0"/>
-              <a:t>Socket.io</a:t>
+              <a:t>Socket.IO</a:t>
             </a:r>
             <a:endParaRPr lang="ru-RU" dirty="0"/>
           </a:p>
@@ -21817,13 +22043,13 @@
   <p:clrMapOvr>
     <a:masterClrMapping/>
   </p:clrMapOvr>
-  <mc:AlternateContent xmlns:mc="http://schemas.openxmlformats.org/markup-compatibility/2006">
-    <mc:Choice xmlns:p14="http://schemas.microsoft.com/office/powerpoint/2010/main" Requires="p14">
+  <mc:AlternateContent xmlns:mc="http://schemas.openxmlformats.org/markup-compatibility/2006" xmlns:p14="http://schemas.microsoft.com/office/powerpoint/2010/main">
+    <mc:Choice Requires="p14">
       <p:transition spd="med" p14:dur="700">
         <p:fade/>
       </p:transition>
     </mc:Choice>
-    <mc:Fallback>
+    <mc:Fallback xmlns="">
       <p:transition spd="med">
         <p:fade/>
       </p:transition>
@@ -21879,11 +22105,11 @@
             </a:r>
             <a:r>
               <a:rPr lang="en-US" dirty="0" smtClean="0"/>
-              <a:t>Socket.io do</a:t>
+              <a:t>Socket.IO </a:t>
             </a:r>
             <a:r>
               <a:rPr lang="en-US" dirty="0" smtClean="0"/>
-              <a:t>?</a:t>
+              <a:t>do?</a:t>
             </a:r>
             <a:endParaRPr lang="ru-RU" dirty="0"/>
           </a:p>
@@ -21979,13 +22205,13 @@
   <p:clrMapOvr>
     <a:masterClrMapping/>
   </p:clrMapOvr>
-  <mc:AlternateContent xmlns:mc="http://schemas.openxmlformats.org/markup-compatibility/2006">
-    <mc:Choice xmlns:p14="http://schemas.microsoft.com/office/powerpoint/2010/main" Requires="p14">
+  <mc:AlternateContent xmlns:mc="http://schemas.openxmlformats.org/markup-compatibility/2006" xmlns:p14="http://schemas.microsoft.com/office/powerpoint/2010/main">
+    <mc:Choice Requires="p14">
       <p:transition spd="med" p14:dur="700">
         <p:fade/>
       </p:transition>
     </mc:Choice>
-    <mc:Fallback>
+    <mc:Fallback xmlns="">
       <p:transition spd="med">
         <p:fade/>
       </p:transition>
@@ -24024,21 +24250,6 @@
 </file>
 
 <file path=customXml/item1.xml><?xml version="1.0" encoding="utf-8"?>
-<?mso-contentType ?>
-<FormTemplates xmlns="http://schemas.microsoft.com/sharepoint/v3/contenttype/forms">
-  <Display>DocumentLibraryForm</Display>
-  <Edit>DocumentLibraryForm</Edit>
-  <New>DocumentLibraryForm</New>
-</FormTemplates>
-</file>
-
-<file path=customXml/item2.xml><?xml version="1.0" encoding="utf-8"?>
-<p:properties xmlns:p="http://schemas.microsoft.com/office/2006/metadata/properties" xmlns:xsi="http://www.w3.org/2001/XMLSchema-instance" xmlns:pc="http://schemas.microsoft.com/office/infopath/2007/PartnerControls">
-  <documentManagement/>
-</p:properties>
-</file>
-
-<file path=customXml/item3.xml><?xml version="1.0" encoding="utf-8"?>
 <ct:contentTypeSchema xmlns:ct="http://schemas.microsoft.com/office/2006/metadata/contentType" xmlns:ma="http://schemas.microsoft.com/office/2006/metadata/properties/metaAttributes" ct:_="" ma:_="" ma:contentTypeName="Document" ma:contentTypeID="0x010100391E57C78B9F604FB8BAD296D1460E2A" ma:contentTypeVersion="1" ma:contentTypeDescription="Create a new document." ma:contentTypeScope="" ma:versionID="fb382fe2362acd2155f454904f478e4d">
   <xsd:schema xmlns:xsd="http://www.w3.org/2001/XMLSchema" xmlns:xs="http://www.w3.org/2001/XMLSchema" xmlns:p="http://schemas.microsoft.com/office/2006/metadata/properties" xmlns:ns3="636b0322-90fb-440c-9cbc-22749e7231e9" targetNamespace="http://schemas.microsoft.com/office/2006/metadata/properties" ma:root="true" ma:fieldsID="b9887c63ce4710c1aeb75a5f03aecb69" ns3:_="">
     <xsd:import namespace="636b0322-90fb-440c-9cbc-22749e7231e9"/>
@@ -24178,10 +24389,35 @@
 </ct:contentTypeSchema>
 </file>
 
+<file path=customXml/item2.xml><?xml version="1.0" encoding="utf-8"?>
+<p:properties xmlns:p="http://schemas.microsoft.com/office/2006/metadata/properties" xmlns:xsi="http://www.w3.org/2001/XMLSchema-instance" xmlns:pc="http://schemas.microsoft.com/office/infopath/2007/PartnerControls">
+  <documentManagement/>
+</p:properties>
+</file>
+
+<file path=customXml/item3.xml><?xml version="1.0" encoding="utf-8"?>
+<?mso-contentType ?>
+<FormTemplates xmlns="http://schemas.microsoft.com/sharepoint/v3/contenttype/forms">
+  <Display>DocumentLibraryForm</Display>
+  <Edit>DocumentLibraryForm</Edit>
+  <New>DocumentLibraryForm</New>
+</FormTemplates>
+</file>
+
 <file path=customXml/itemProps1.xml><?xml version="1.0" encoding="utf-8"?>
-<ds:datastoreItem xmlns:ds="http://schemas.openxmlformats.org/officeDocument/2006/customXml" ds:itemID="{B0CA13EC-1D3C-4D6F-8D1C-E8A452CFC79A}">
+<ds:datastoreItem xmlns:ds="http://schemas.openxmlformats.org/officeDocument/2006/customXml" ds:itemID="{7B70CE0C-0988-423A-BF66-B40F6A1061FF}">
   <ds:schemaRefs>
-    <ds:schemaRef ds:uri="http://schemas.microsoft.com/sharepoint/v3/contenttype/forms"/>
+    <ds:schemaRef ds:uri="http://schemas.microsoft.com/office/2006/metadata/contentType"/>
+    <ds:schemaRef ds:uri="http://schemas.microsoft.com/office/2006/metadata/properties/metaAttributes"/>
+    <ds:schemaRef ds:uri="http://www.w3.org/2001/XMLSchema"/>
+    <ds:schemaRef ds:uri="http://schemas.microsoft.com/office/2006/metadata/properties"/>
+    <ds:schemaRef ds:uri="636b0322-90fb-440c-9cbc-22749e7231e9"/>
+    <ds:schemaRef ds:uri="http://schemas.microsoft.com/office/2006/documentManagement/types"/>
+    <ds:schemaRef ds:uri="http://schemas.microsoft.com/office/infopath/2007/PartnerControls"/>
+    <ds:schemaRef ds:uri="http://schemas.openxmlformats.org/package/2006/metadata/core-properties"/>
+    <ds:schemaRef ds:uri="http://purl.org/dc/elements/1.1/"/>
+    <ds:schemaRef ds:uri="http://purl.org/dc/terms/"/>
+    <ds:schemaRef ds:uri="http://schemas.microsoft.com/internal/obd"/>
   </ds:schemaRefs>
 </ds:datastoreItem>
 </file>
@@ -24203,19 +24439,9 @@
 </file>
 
 <file path=customXml/itemProps3.xml><?xml version="1.0" encoding="utf-8"?>
-<ds:datastoreItem xmlns:ds="http://schemas.openxmlformats.org/officeDocument/2006/customXml" ds:itemID="{7B70CE0C-0988-423A-BF66-B40F6A1061FF}">
+<ds:datastoreItem xmlns:ds="http://schemas.openxmlformats.org/officeDocument/2006/customXml" ds:itemID="{B0CA13EC-1D3C-4D6F-8D1C-E8A452CFC79A}">
   <ds:schemaRefs>
-    <ds:schemaRef ds:uri="http://schemas.microsoft.com/office/2006/metadata/contentType"/>
-    <ds:schemaRef ds:uri="http://schemas.microsoft.com/office/2006/metadata/properties/metaAttributes"/>
-    <ds:schemaRef ds:uri="http://www.w3.org/2001/XMLSchema"/>
-    <ds:schemaRef ds:uri="http://schemas.microsoft.com/office/2006/metadata/properties"/>
-    <ds:schemaRef ds:uri="636b0322-90fb-440c-9cbc-22749e7231e9"/>
-    <ds:schemaRef ds:uri="http://schemas.microsoft.com/office/2006/documentManagement/types"/>
-    <ds:schemaRef ds:uri="http://schemas.microsoft.com/office/infopath/2007/PartnerControls"/>
-    <ds:schemaRef ds:uri="http://schemas.openxmlformats.org/package/2006/metadata/core-properties"/>
-    <ds:schemaRef ds:uri="http://purl.org/dc/elements/1.1/"/>
-    <ds:schemaRef ds:uri="http://purl.org/dc/terms/"/>
-    <ds:schemaRef ds:uri="http://schemas.microsoft.com/internal/obd"/>
+    <ds:schemaRef ds:uri="http://schemas.microsoft.com/sharepoint/v3/contenttype/forms"/>
   </ds:schemaRefs>
 </ds:datastoreItem>
 </file>
</xml_diff>